<commit_message>
Make it working again
</commit_message>
<xml_diff>
--- a/streams_meetup_presentation.pptx
+++ b/streams_meetup_presentation.pptx
@@ -15,6 +15,7 @@
     <p:sldId id="265" r:id="rId9"/>
     <p:sldId id="259" r:id="rId10"/>
     <p:sldId id="260" r:id="rId11"/>
+    <p:sldId id="266" r:id="rId12"/>
   </p:sldIdLst>
   <p:sldSz cx="12192000" cy="6858000"/>
   <p:notesSz cx="6858000" cy="9144000"/>
@@ -3320,42 +3321,31 @@
             <p:ph type="subTitle" idx="1"/>
           </p:nvPr>
         </p:nvSpPr>
-        <p:spPr/>
+        <p:spPr>
+          <a:xfrm>
+            <a:off x="4887211" y="4944215"/>
+            <a:ext cx="6801612" cy="1239894"/>
+          </a:xfrm>
+        </p:spPr>
         <p:txBody>
           <a:bodyPr/>
           <a:lstStyle/>
           <a:p>
             <a:r>
               <a:rPr lang="en-US" dirty="0" smtClean="0"/>
-              <a:t>BY DAVID VIRGIL</a:t>
-            </a:r>
-          </a:p>
-          <a:p>
-            <a:r>
-              <a:rPr lang="en-US" dirty="0"/>
-              <a:t>https://</a:t>
-            </a:r>
-            <a:r>
-              <a:rPr lang="en-US" dirty="0" err="1"/>
-              <a:t>github.com</a:t>
-            </a:r>
-            <a:r>
-              <a:rPr lang="en-US" dirty="0"/>
-              <a:t>/</a:t>
-            </a:r>
-            <a:r>
-              <a:rPr lang="en-US" dirty="0" err="1"/>
-              <a:t>dvirgiln</a:t>
-            </a:r>
-            <a:r>
-              <a:rPr lang="en-US" dirty="0"/>
-              <a:t>/streams-</a:t>
-            </a:r>
-            <a:r>
-              <a:rPr lang="en-US" dirty="0" err="1"/>
-              <a:t>kafka</a:t>
-            </a:r>
-            <a:endParaRPr lang="en-US" dirty="0"/>
+              <a:t>BY DAVID </a:t>
+            </a:r>
+            <a:r>
+              <a:rPr lang="en-US" dirty="0" smtClean="0"/>
+              <a:t>VIRGIL</a:t>
+            </a:r>
+          </a:p>
+          <a:p>
+            <a:r>
+              <a:rPr lang="en-US" dirty="0" smtClean="0"/>
+              <a:t>Senior Software Engineer at Expedia</a:t>
+            </a:r>
+            <a:endParaRPr lang="en-US" dirty="0" smtClean="0"/>
           </a:p>
         </p:txBody>
       </p:sp>
@@ -3369,6 +3359,13 @@
   <p:clrMapOvr>
     <a:masterClrMapping/>
   </p:clrMapOvr>
+  <p:timing>
+    <p:tnLst>
+      <p:par>
+        <p:cTn id="1" dur="indefinite" restart="never" nodeType="tmRoot"/>
+      </p:par>
+    </p:tnLst>
+  </p:timing>
 </p:sld>
 </file>
 
@@ -3422,33 +3419,59 @@
             <p:ph idx="1"/>
           </p:nvPr>
         </p:nvSpPr>
-        <p:spPr/>
+        <p:spPr>
+          <a:xfrm>
+            <a:off x="2130014" y="2638044"/>
+            <a:ext cx="7830850" cy="3343208"/>
+          </a:xfrm>
+        </p:spPr>
         <p:txBody>
           <a:bodyPr>
             <a:normAutofit fontScale="92500" lnSpcReduction="20000"/>
           </a:bodyPr>
           <a:lstStyle/>
           <a:p>
+            <a:pPr>
+              <a:buClr>
+                <a:srgbClr val="FF0000"/>
+              </a:buClr>
+              <a:buBlip>
+                <a:blip r:embed="rId2"/>
+              </a:buBlip>
+            </a:pPr>
+            <a:r>
+              <a:rPr lang="en-US" dirty="0"/>
+              <a:t>Usage of all spark </a:t>
+            </a:r>
             <a:r>
               <a:rPr lang="en-US" dirty="0" smtClean="0"/>
-              <a:t>Usage of all spark infrastructure.</a:t>
-            </a:r>
-          </a:p>
-          <a:p>
-            <a:r>
-              <a:rPr lang="en-US" dirty="0" smtClean="0"/>
+              <a:t>infrastructure.</a:t>
+            </a:r>
+            <a:endParaRPr lang="en-US" dirty="0"/>
+          </a:p>
+          <a:p>
+            <a:pPr>
+              <a:buClr>
+                <a:srgbClr val="FF0000"/>
+              </a:buClr>
+              <a:buBlip>
+                <a:blip r:embed="rId2"/>
+              </a:buBlip>
+            </a:pPr>
+            <a:r>
+              <a:rPr lang="en-US" dirty="0"/>
               <a:t>Easy integration with Spark RDDs, </a:t>
             </a:r>
             <a:r>
-              <a:rPr lang="en-US" dirty="0" err="1" smtClean="0"/>
+              <a:rPr lang="en-US" dirty="0" err="1"/>
               <a:t>Dataframes</a:t>
             </a:r>
             <a:r>
-              <a:rPr lang="en-US" dirty="0" smtClean="0"/>
+              <a:rPr lang="en-US" dirty="0"/>
               <a:t>, </a:t>
             </a:r>
             <a:r>
-              <a:rPr lang="en-US" dirty="0" err="1" smtClean="0"/>
+              <a:rPr lang="en-US" dirty="0" err="1"/>
               <a:t>Mllib</a:t>
             </a:r>
             <a:r>
@@ -3457,27 +3480,46 @@
             </a:r>
           </a:p>
           <a:p>
+            <a:pPr>
+              <a:buClr>
+                <a:srgbClr val="FF0000"/>
+              </a:buClr>
+              <a:buBlip>
+                <a:blip r:embed="rId2"/>
+              </a:buBlip>
+            </a:pPr>
             <a:r>
               <a:rPr lang="en-US" dirty="0" smtClean="0"/>
-              <a:t>Not very flexible as </a:t>
-            </a:r>
-            <a:r>
-              <a:rPr lang="en-US" dirty="0" err="1" smtClean="0"/>
-              <a:t>Akka</a:t>
-            </a:r>
+              <a:t>Works in a Spark Cluster.</a:t>
+            </a:r>
+            <a:endParaRPr lang="en-US" dirty="0"/>
+          </a:p>
+          <a:p>
+            <a:pPr>
+              <a:buClr>
+                <a:srgbClr val="FF0000"/>
+              </a:buClr>
+              <a:buBlip>
+                <a:blip r:embed="rId2"/>
+              </a:buBlip>
+            </a:pPr>
             <a:r>
               <a:rPr lang="en-US" dirty="0" smtClean="0"/>
-              <a:t>.</a:t>
-            </a:r>
-          </a:p>
-          <a:p>
+              <a:t>Easy </a:t>
+            </a:r>
+            <a:r>
+              <a:rPr lang="en-US" dirty="0"/>
+              <a:t>windowing and watermarking.  </a:t>
+            </a:r>
+          </a:p>
+          <a:p>
+            <a:pPr marL="228600" lvl="1" indent="0">
+              <a:buNone/>
+            </a:pPr>
             <a:r>
               <a:rPr lang="en-US" dirty="0" smtClean="0"/>
-              <a:t>Easy windowing and watermarking.  </a:t>
-            </a:r>
-          </a:p>
-          <a:p>
-            <a:pPr lvl="1"/>
+              <a:t>	</a:t>
+            </a:r>
             <a:r>
               <a:rPr lang="en-US" dirty="0" err="1" smtClean="0"/>
               <a:t>dstream.groupBy</a:t>
@@ -3516,6 +3558,10 @@
               <a:buNone/>
             </a:pPr>
             <a:r>
+              <a:rPr lang="en-US" dirty="0" smtClean="0"/>
+              <a:t>		</a:t>
+            </a:r>
+            <a:r>
               <a:rPr lang="en-US" dirty="0" err="1" smtClean="0"/>
               <a:t>withWatermark</a:t>
             </a:r>
@@ -3537,16 +3583,20 @@
             </a:r>
             <a:r>
               <a:rPr lang="en-US" dirty="0" smtClean="0"/>
-              <a:t>", ”3 minutes</a:t>
-            </a:r>
-            <a:r>
-              <a:rPr lang="en-US" dirty="0" smtClean="0"/>
-              <a:t>")</a:t>
-            </a:r>
-          </a:p>
-          <a:p>
-            <a:r>
-              <a:rPr lang="en-US" dirty="0" smtClean="0"/>
+              <a:t>", ”3 minutes")</a:t>
+            </a:r>
+          </a:p>
+          <a:p>
+            <a:pPr>
+              <a:buClr>
+                <a:srgbClr val="FF0000"/>
+              </a:buClr>
+              <a:buBlip>
+                <a:blip r:embed="rId2"/>
+              </a:buBlip>
+            </a:pPr>
+            <a:r>
+              <a:rPr lang="en-US" dirty="0"/>
               <a:t>Enable back pressure by setting property:</a:t>
             </a:r>
           </a:p>
@@ -3555,19 +3605,45 @@
               <a:buNone/>
             </a:pPr>
             <a:r>
+              <a:rPr lang="en-US" dirty="0" err="1" smtClean="0"/>
+              <a:t>spark.streaming.backpressure.enabled</a:t>
+            </a:r>
+            <a:endParaRPr lang="en-US" dirty="0" smtClean="0"/>
+          </a:p>
+          <a:p>
+            <a:pPr>
+              <a:buClr>
+                <a:srgbClr val="FF0000"/>
+              </a:buClr>
+              <a:buBlip>
+                <a:blip r:embed="rId3"/>
+              </a:buBlip>
+            </a:pPr>
+            <a:r>
+              <a:rPr lang="en-US" dirty="0" smtClean="0"/>
+              <a:t>Scala 2.11</a:t>
+            </a:r>
+          </a:p>
+          <a:p>
+            <a:pPr>
+              <a:buClr>
+                <a:srgbClr val="FF0000"/>
+              </a:buClr>
+              <a:buBlip>
+                <a:blip r:embed="rId3"/>
+              </a:buBlip>
+            </a:pPr>
+            <a:r>
+              <a:rPr lang="en-US" dirty="0"/>
+              <a:t>Not very flexible as </a:t>
+            </a:r>
+            <a:r>
               <a:rPr lang="en-US" dirty="0" err="1"/>
-              <a:t>spark.streaming.backpressure.enabled</a:t>
-            </a:r>
-            <a:endParaRPr lang="en-US" dirty="0" smtClean="0"/>
-          </a:p>
-          <a:p>
+              <a:t>Akka</a:t>
+            </a:r>
             <a:r>
               <a:rPr lang="en-US" dirty="0" smtClean="0"/>
-              <a:t>Scala </a:t>
-            </a:r>
-            <a:r>
-              <a:rPr lang="en-US" dirty="0" smtClean="0"/>
-              <a:t>2.11</a:t>
+              <a:t>.</a:t>
             </a:r>
             <a:endParaRPr lang="en-US" dirty="0"/>
           </a:p>
@@ -3577,6 +3653,109 @@
     <p:extLst>
       <p:ext uri="{BB962C8B-B14F-4D97-AF65-F5344CB8AC3E}">
         <p14:creationId xmlns:p14="http://schemas.microsoft.com/office/powerpoint/2010/main" val="1057899849"/>
+      </p:ext>
+    </p:extLst>
+  </p:cSld>
+  <p:clrMapOvr>
+    <a:masterClrMapping/>
+  </p:clrMapOvr>
+  <p:timing>
+    <p:tnLst>
+      <p:par>
+        <p:cTn id="1" dur="indefinite" restart="never" nodeType="tmRoot"/>
+      </p:par>
+    </p:tnLst>
+  </p:timing>
+</p:sld>
+</file>
+
+<file path=ppt/slides/slide11.xml><?xml version="1.0" encoding="utf-8"?>
+<p:sld xmlns:a="http://schemas.openxmlformats.org/drawingml/2006/main" xmlns:r="http://schemas.openxmlformats.org/officeDocument/2006/relationships" xmlns:p="http://schemas.openxmlformats.org/presentationml/2006/main">
+  <p:cSld>
+    <p:spTree>
+      <p:nvGrpSpPr>
+        <p:cNvPr id="1" name=""/>
+        <p:cNvGrpSpPr/>
+        <p:nvPr/>
+      </p:nvGrpSpPr>
+      <p:grpSpPr>
+        <a:xfrm>
+          <a:off x="0" y="0"/>
+          <a:ext cx="0" cy="0"/>
+          <a:chOff x="0" y="0"/>
+          <a:chExt cx="0" cy="0"/>
+        </a:xfrm>
+      </p:grpSpPr>
+      <p:sp>
+        <p:nvSpPr>
+          <p:cNvPr id="2" name="Title 1"/>
+          <p:cNvSpPr>
+            <a:spLocks noGrp="1"/>
+          </p:cNvSpPr>
+          <p:nvPr>
+            <p:ph type="title"/>
+          </p:nvPr>
+        </p:nvSpPr>
+        <p:spPr/>
+        <p:txBody>
+          <a:bodyPr/>
+          <a:lstStyle/>
+          <a:p>
+            <a:r>
+              <a:rPr lang="en-US" dirty="0" smtClean="0"/>
+              <a:t>Questions ???</a:t>
+            </a:r>
+            <a:endParaRPr lang="en-US" dirty="0"/>
+          </a:p>
+        </p:txBody>
+      </p:sp>
+      <p:sp>
+        <p:nvSpPr>
+          <p:cNvPr id="3" name="Content Placeholder 2"/>
+          <p:cNvSpPr>
+            <a:spLocks noGrp="1"/>
+          </p:cNvSpPr>
+          <p:nvPr>
+            <p:ph idx="1"/>
+          </p:nvPr>
+        </p:nvSpPr>
+        <p:spPr/>
+        <p:txBody>
+          <a:bodyPr/>
+          <a:lstStyle/>
+          <a:p>
+            <a:r>
+              <a:rPr lang="en-US" dirty="0"/>
+              <a:t>https://</a:t>
+            </a:r>
+            <a:r>
+              <a:rPr lang="en-US" dirty="0" err="1"/>
+              <a:t>github.com</a:t>
+            </a:r>
+            <a:r>
+              <a:rPr lang="en-US" dirty="0"/>
+              <a:t>/</a:t>
+            </a:r>
+            <a:r>
+              <a:rPr lang="en-US" dirty="0" err="1"/>
+              <a:t>dvirgiln</a:t>
+            </a:r>
+            <a:r>
+              <a:rPr lang="en-US" dirty="0"/>
+              <a:t>/streams-</a:t>
+            </a:r>
+            <a:r>
+              <a:rPr lang="en-US" dirty="0" err="1"/>
+              <a:t>kafka</a:t>
+            </a:r>
+            <a:endParaRPr lang="en-US" dirty="0"/>
+          </a:p>
+        </p:txBody>
+      </p:sp>
+    </p:spTree>
+    <p:extLst>
+      <p:ext uri="{BB962C8B-B14F-4D97-AF65-F5344CB8AC3E}">
+        <p14:creationId xmlns:p14="http://schemas.microsoft.com/office/powerpoint/2010/main" val="71284197"/>
       </p:ext>
     </p:extLst>
   </p:cSld>
@@ -3723,6 +3902,13 @@
   <p:clrMapOvr>
     <a:masterClrMapping/>
   </p:clrMapOvr>
+  <p:timing>
+    <p:tnLst>
+      <p:par>
+        <p:cTn id="1" dur="indefinite" restart="never" nodeType="tmRoot"/>
+      </p:par>
+    </p:tnLst>
+  </p:timing>
 </p:sld>
 </file>
 
@@ -4654,6 +4840,258 @@
           </a:p>
         </p:txBody>
       </p:sp>
+      <p:sp>
+        <p:nvSpPr>
+          <p:cNvPr id="6" name="Oval 5"/>
+          <p:cNvSpPr/>
+          <p:nvPr/>
+        </p:nvSpPr>
+        <p:spPr>
+          <a:xfrm>
+            <a:off x="699124" y="2232820"/>
+            <a:ext cx="473337" cy="461665"/>
+          </a:xfrm>
+          <a:prstGeom prst="ellipse">
+            <a:avLst/>
+          </a:prstGeom>
+        </p:spPr>
+        <p:style>
+          <a:lnRef idx="2">
+            <a:schemeClr val="accent1">
+              <a:shade val="50000"/>
+            </a:schemeClr>
+          </a:lnRef>
+          <a:fillRef idx="1">
+            <a:schemeClr val="accent1"/>
+          </a:fillRef>
+          <a:effectRef idx="0">
+            <a:schemeClr val="accent1"/>
+          </a:effectRef>
+          <a:fontRef idx="minor">
+            <a:schemeClr val="lt1"/>
+          </a:fontRef>
+        </p:style>
+        <p:txBody>
+          <a:bodyPr rtlCol="0" anchor="ctr"/>
+          <a:lstStyle/>
+          <a:p>
+            <a:pPr algn="ctr"/>
+            <a:endParaRPr lang="en-US"/>
+          </a:p>
+        </p:txBody>
+      </p:sp>
+      <p:sp>
+        <p:nvSpPr>
+          <p:cNvPr id="3" name="TextBox 2"/>
+          <p:cNvSpPr txBox="1"/>
+          <p:nvPr/>
+        </p:nvSpPr>
+        <p:spPr>
+          <a:xfrm>
+            <a:off x="752912" y="2232820"/>
+            <a:ext cx="559397" cy="461665"/>
+          </a:xfrm>
+          <a:prstGeom prst="rect">
+            <a:avLst/>
+          </a:prstGeom>
+          <a:noFill/>
+        </p:spPr>
+        <p:txBody>
+          <a:bodyPr wrap="square" rtlCol="0">
+            <a:spAutoFit/>
+          </a:bodyPr>
+          <a:lstStyle/>
+          <a:p>
+            <a:r>
+              <a:rPr lang="en-US" sz="2400" dirty="0" smtClean="0">
+                <a:solidFill>
+                  <a:srgbClr val="FF0000"/>
+                </a:solidFill>
+                <a:latin typeface="Arial" charset="0"/>
+                <a:ea typeface="Arial" charset="0"/>
+                <a:cs typeface="Arial" charset="0"/>
+              </a:rPr>
+              <a:t>1</a:t>
+            </a:r>
+            <a:endParaRPr lang="en-US" sz="2400" dirty="0">
+              <a:solidFill>
+                <a:srgbClr val="FF0000"/>
+              </a:solidFill>
+              <a:latin typeface="Arial" charset="0"/>
+              <a:ea typeface="Arial" charset="0"/>
+              <a:cs typeface="Arial" charset="0"/>
+            </a:endParaRPr>
+          </a:p>
+        </p:txBody>
+      </p:sp>
+      <p:sp>
+        <p:nvSpPr>
+          <p:cNvPr id="40" name="Oval 39"/>
+          <p:cNvSpPr/>
+          <p:nvPr/>
+        </p:nvSpPr>
+        <p:spPr>
+          <a:xfrm>
+            <a:off x="10762917" y="2330696"/>
+            <a:ext cx="473337" cy="461665"/>
+          </a:xfrm>
+          <a:prstGeom prst="ellipse">
+            <a:avLst/>
+          </a:prstGeom>
+        </p:spPr>
+        <p:style>
+          <a:lnRef idx="2">
+            <a:schemeClr val="accent1">
+              <a:shade val="50000"/>
+            </a:schemeClr>
+          </a:lnRef>
+          <a:fillRef idx="1">
+            <a:schemeClr val="accent1"/>
+          </a:fillRef>
+          <a:effectRef idx="0">
+            <a:schemeClr val="accent1"/>
+          </a:effectRef>
+          <a:fontRef idx="minor">
+            <a:schemeClr val="lt1"/>
+          </a:fontRef>
+        </p:style>
+        <p:txBody>
+          <a:bodyPr rtlCol="0" anchor="ctr"/>
+          <a:lstStyle/>
+          <a:p>
+            <a:pPr algn="ctr"/>
+            <a:endParaRPr lang="en-US"/>
+          </a:p>
+        </p:txBody>
+      </p:sp>
+      <p:sp>
+        <p:nvSpPr>
+          <p:cNvPr id="42" name="TextBox 41"/>
+          <p:cNvSpPr txBox="1"/>
+          <p:nvPr/>
+        </p:nvSpPr>
+        <p:spPr>
+          <a:xfrm>
+            <a:off x="10816705" y="2330696"/>
+            <a:ext cx="559397" cy="461665"/>
+          </a:xfrm>
+          <a:prstGeom prst="rect">
+            <a:avLst/>
+          </a:prstGeom>
+          <a:noFill/>
+        </p:spPr>
+        <p:txBody>
+          <a:bodyPr wrap="square" rtlCol="0">
+            <a:spAutoFit/>
+          </a:bodyPr>
+          <a:lstStyle/>
+          <a:p>
+            <a:r>
+              <a:rPr lang="en-US" sz="2400" dirty="0">
+                <a:solidFill>
+                  <a:srgbClr val="FF0000"/>
+                </a:solidFill>
+                <a:latin typeface="Arial" charset="0"/>
+                <a:ea typeface="Arial" charset="0"/>
+                <a:cs typeface="Arial" charset="0"/>
+              </a:rPr>
+              <a:t>2</a:t>
+            </a:r>
+            <a:endParaRPr lang="en-US" sz="2400" dirty="0">
+              <a:solidFill>
+                <a:srgbClr val="FF0000"/>
+              </a:solidFill>
+              <a:latin typeface="Arial" charset="0"/>
+              <a:ea typeface="Arial" charset="0"/>
+              <a:cs typeface="Arial" charset="0"/>
+            </a:endParaRPr>
+          </a:p>
+        </p:txBody>
+      </p:sp>
+      <p:sp>
+        <p:nvSpPr>
+          <p:cNvPr id="43" name="Oval 42"/>
+          <p:cNvSpPr/>
+          <p:nvPr/>
+        </p:nvSpPr>
+        <p:spPr>
+          <a:xfrm>
+            <a:off x="6650861" y="4431254"/>
+            <a:ext cx="473337" cy="461665"/>
+          </a:xfrm>
+          <a:prstGeom prst="ellipse">
+            <a:avLst/>
+          </a:prstGeom>
+        </p:spPr>
+        <p:style>
+          <a:lnRef idx="2">
+            <a:schemeClr val="accent1">
+              <a:shade val="50000"/>
+            </a:schemeClr>
+          </a:lnRef>
+          <a:fillRef idx="1">
+            <a:schemeClr val="accent1"/>
+          </a:fillRef>
+          <a:effectRef idx="0">
+            <a:schemeClr val="accent1"/>
+          </a:effectRef>
+          <a:fontRef idx="minor">
+            <a:schemeClr val="lt1"/>
+          </a:fontRef>
+        </p:style>
+        <p:txBody>
+          <a:bodyPr rtlCol="0" anchor="ctr"/>
+          <a:lstStyle/>
+          <a:p>
+            <a:pPr algn="ctr"/>
+            <a:endParaRPr lang="en-US"/>
+          </a:p>
+        </p:txBody>
+      </p:sp>
+      <p:sp>
+        <p:nvSpPr>
+          <p:cNvPr id="44" name="TextBox 43"/>
+          <p:cNvSpPr txBox="1"/>
+          <p:nvPr/>
+        </p:nvSpPr>
+        <p:spPr>
+          <a:xfrm>
+            <a:off x="6704649" y="4431254"/>
+            <a:ext cx="559397" cy="461665"/>
+          </a:xfrm>
+          <a:prstGeom prst="rect">
+            <a:avLst/>
+          </a:prstGeom>
+          <a:noFill/>
+        </p:spPr>
+        <p:txBody>
+          <a:bodyPr wrap="square" rtlCol="0">
+            <a:spAutoFit/>
+          </a:bodyPr>
+          <a:lstStyle/>
+          <a:p>
+            <a:r>
+              <a:rPr lang="en-US" sz="2400" dirty="0">
+                <a:solidFill>
+                  <a:srgbClr val="FF0000"/>
+                </a:solidFill>
+                <a:latin typeface="Arial" charset="0"/>
+                <a:ea typeface="Arial" charset="0"/>
+                <a:cs typeface="Arial" charset="0"/>
+              </a:rPr>
+              <a:t>3</a:t>
+            </a:r>
+            <a:endParaRPr lang="en-US" sz="2400" dirty="0">
+              <a:solidFill>
+                <a:srgbClr val="FF0000"/>
+              </a:solidFill>
+              <a:latin typeface="Arial" charset="0"/>
+              <a:ea typeface="Arial" charset="0"/>
+              <a:cs typeface="Arial" charset="0"/>
+            </a:endParaRPr>
+          </a:p>
+        </p:txBody>
+      </p:sp>
     </p:spTree>
     <p:extLst>
       <p:ext uri="{BB962C8B-B14F-4D97-AF65-F5344CB8AC3E}">
@@ -4664,6 +5102,13 @@
   <p:clrMapOvr>
     <a:masterClrMapping/>
   </p:clrMapOvr>
+  <p:timing>
+    <p:tnLst>
+      <p:par>
+        <p:cTn id="1" dur="indefinite" restart="never" nodeType="tmRoot"/>
+      </p:par>
+    </p:tnLst>
+  </p:timing>
 </p:sld>
 </file>
 
@@ -4892,6 +5337,13 @@
   <p:clrMapOvr>
     <a:masterClrMapping/>
   </p:clrMapOvr>
+  <p:timing>
+    <p:tnLst>
+      <p:par>
+        <p:cTn id="1" dur="indefinite" restart="never" nodeType="tmRoot"/>
+      </p:par>
+    </p:tnLst>
+  </p:timing>
 </p:sld>
 </file>
 
@@ -5336,6 +5788,13 @@
   <p:clrMapOvr>
     <a:masterClrMapping/>
   </p:clrMapOvr>
+  <p:timing>
+    <p:tnLst>
+      <p:par>
+        <p:cTn id="1" dur="indefinite" restart="never" nodeType="tmRoot"/>
+      </p:par>
+    </p:tnLst>
+  </p:timing>
 </p:sld>
 </file>
 
@@ -5505,6 +5964,13 @@
   <p:clrMapOvr>
     <a:masterClrMapping/>
   </p:clrMapOvr>
+  <p:timing>
+    <p:tnLst>
+      <p:par>
+        <p:cTn id="1" dur="indefinite" restart="never" nodeType="tmRoot"/>
+      </p:par>
+    </p:tnLst>
+  </p:timing>
 </p:sld>
 </file>
 
@@ -5584,7 +6050,15 @@
             </a:r>
             <a:r>
               <a:rPr lang="en-US" dirty="0" smtClean="0"/>
-              <a:t> Producer. Every 5 seconds:</a:t>
+              <a:t> Producer. Every </a:t>
+            </a:r>
+            <a:r>
+              <a:rPr lang="en-US" dirty="0" smtClean="0"/>
+              <a:t>1seconds</a:t>
+            </a:r>
+            <a:r>
+              <a:rPr lang="en-US" dirty="0" smtClean="0"/>
+              <a:t>:</a:t>
             </a:r>
           </a:p>
           <a:p>
@@ -7387,6 +7861,13 @@
   <p:clrMapOvr>
     <a:masterClrMapping/>
   </p:clrMapOvr>
+  <p:timing>
+    <p:tnLst>
+      <p:par>
+        <p:cTn id="1" dur="indefinite" restart="never" nodeType="tmRoot"/>
+      </p:par>
+    </p:tnLst>
+  </p:timing>
 </p:sld>
 </file>
 
@@ -7407,6 +7888,46 @@
           <a:chExt cx="0" cy="0"/>
         </a:xfrm>
       </p:grpSpPr>
+      <p:sp>
+        <p:nvSpPr>
+          <p:cNvPr id="7" name="Rounded Rectangle 6"/>
+          <p:cNvSpPr/>
+          <p:nvPr/>
+        </p:nvSpPr>
+        <p:spPr>
+          <a:xfrm>
+            <a:off x="5454127" y="3054696"/>
+            <a:ext cx="6390043" cy="3057241"/>
+          </a:xfrm>
+          <a:prstGeom prst="roundRect">
+            <a:avLst/>
+          </a:prstGeom>
+        </p:spPr>
+        <p:style>
+          <a:lnRef idx="2">
+            <a:schemeClr val="accent4">
+              <a:shade val="50000"/>
+            </a:schemeClr>
+          </a:lnRef>
+          <a:fillRef idx="1">
+            <a:schemeClr val="accent4"/>
+          </a:fillRef>
+          <a:effectRef idx="0">
+            <a:schemeClr val="accent4"/>
+          </a:effectRef>
+          <a:fontRef idx="minor">
+            <a:schemeClr val="lt1"/>
+          </a:fontRef>
+        </p:style>
+        <p:txBody>
+          <a:bodyPr rtlCol="0" anchor="ctr"/>
+          <a:lstStyle/>
+          <a:p>
+            <a:pPr algn="ctr"/>
+            <a:endParaRPr lang="en-US"/>
+          </a:p>
+        </p:txBody>
+      </p:sp>
       <p:sp>
         <p:nvSpPr>
           <p:cNvPr id="2" name="Title 1"/>
@@ -7979,8 +8500,8 @@
         </p:nvSpPr>
         <p:spPr>
           <a:xfrm rot="10800000">
-            <a:off x="4624714" y="3636084"/>
-            <a:ext cx="1593206" cy="160387"/>
+            <a:off x="4624713" y="3636083"/>
+            <a:ext cx="625018" cy="160390"/>
           </a:xfrm>
           <a:prstGeom prst="rightArrow">
             <a:avLst/>
@@ -8033,7 +8554,7 @@
         </p:blipFill>
         <p:spPr>
           <a:xfrm>
-            <a:off x="6217920" y="4214507"/>
+            <a:off x="5573441" y="4228218"/>
             <a:ext cx="858621" cy="635000"/>
           </a:xfrm>
           <a:prstGeom prst="rect">
@@ -8049,8 +8570,8 @@
         </p:nvSpPr>
         <p:spPr>
           <a:xfrm>
-            <a:off x="7628781" y="4033899"/>
-            <a:ext cx="4664165" cy="1631216"/>
+            <a:off x="7090899" y="3988279"/>
+            <a:ext cx="4753271" cy="2123658"/>
           </a:xfrm>
           <a:prstGeom prst="rect">
             <a:avLst/>
@@ -8064,159 +8585,159 @@
           <a:lstStyle/>
           <a:p>
             <a:r>
-              <a:rPr lang="en-US" sz="1000" dirty="0" smtClean="0"/>
+              <a:rPr lang="en-US" sz="1400" dirty="0" smtClean="0"/>
               <a:t>id=1 </a:t>
             </a:r>
             <a:r>
-              <a:rPr lang="en-US" sz="1000" dirty="0"/>
+              <a:rPr lang="en-US" sz="1400" dirty="0"/>
               <a:t>mean: [</a:t>
             </a:r>
             <a:r>
-              <a:rPr lang="en-US" sz="1000" dirty="0" smtClean="0"/>
+              <a:rPr lang="en-US" sz="1400" dirty="0" smtClean="0"/>
               <a:t>2108.063 , 67.1666, 83.666] </a:t>
             </a:r>
             <a:r>
-              <a:rPr lang="en-US" sz="1000" dirty="0"/>
+              <a:rPr lang="en-US" sz="1400" dirty="0"/>
               <a:t>count: </a:t>
             </a:r>
             <a:r>
-              <a:rPr lang="en-US" sz="1000" dirty="0" smtClean="0"/>
+              <a:rPr lang="en-US" sz="1400" dirty="0" smtClean="0"/>
               <a:t>6 variance </a:t>
             </a:r>
             <a:r>
-              <a:rPr lang="mr-IN" sz="1000" dirty="0" smtClean="0"/>
+              <a:rPr lang="mr-IN" sz="1400" dirty="0" smtClean="0"/>
               <a:t>…</a:t>
             </a:r>
-            <a:endParaRPr lang="en-US" sz="1000" dirty="0" smtClean="0"/>
-          </a:p>
-          <a:p>
-            <a:r>
-              <a:rPr lang="en-US" sz="1000" dirty="0"/>
+            <a:endParaRPr lang="en-US" sz="1400" dirty="0" smtClean="0"/>
+          </a:p>
+          <a:p>
+            <a:r>
+              <a:rPr lang="en-US" sz="1400" dirty="0"/>
               <a:t>id=2 mean: [</a:t>
             </a:r>
             <a:r>
-              <a:rPr lang="en-US" sz="1000" dirty="0" smtClean="0"/>
+              <a:rPr lang="en-US" sz="1400" dirty="0" smtClean="0"/>
               <a:t>2.063 </a:t>
             </a:r>
             <a:r>
-              <a:rPr lang="en-US" sz="1000" dirty="0"/>
+              <a:rPr lang="en-US" sz="1400" dirty="0"/>
               <a:t>, 67.1666, 83.666] count: 6 variance </a:t>
             </a:r>
             <a:r>
-              <a:rPr lang="mr-IN" sz="1000" dirty="0"/>
+              <a:rPr lang="mr-IN" sz="1400" dirty="0"/>
               <a:t>…</a:t>
             </a:r>
-            <a:endParaRPr lang="en-US" sz="1000" dirty="0"/>
-          </a:p>
-          <a:p>
-            <a:r>
-              <a:rPr lang="en-US" sz="1000" dirty="0" smtClean="0"/>
+            <a:endParaRPr lang="en-US" sz="1400" dirty="0"/>
+          </a:p>
+          <a:p>
+            <a:r>
+              <a:rPr lang="en-US" sz="1400" dirty="0" smtClean="0"/>
               <a:t>id=3 </a:t>
             </a:r>
             <a:r>
-              <a:rPr lang="en-US" sz="1000" dirty="0"/>
+              <a:rPr lang="en-US" sz="1400" dirty="0"/>
               <a:t>mean: </a:t>
             </a:r>
             <a:r>
-              <a:rPr lang="en-US" sz="1000" dirty="0" smtClean="0"/>
+              <a:rPr lang="en-US" sz="1400" dirty="0" smtClean="0"/>
               <a:t>[4108.063 </a:t>
             </a:r>
             <a:r>
-              <a:rPr lang="en-US" sz="1000" dirty="0"/>
+              <a:rPr lang="en-US" sz="1400" dirty="0"/>
               <a:t>, 67.1666, 83.666] count: 6 variance </a:t>
             </a:r>
             <a:r>
-              <a:rPr lang="mr-IN" sz="1000" dirty="0"/>
+              <a:rPr lang="mr-IN" sz="1400" dirty="0"/>
               <a:t>…</a:t>
             </a:r>
-            <a:endParaRPr lang="en-US" sz="1000" dirty="0"/>
-          </a:p>
-          <a:p>
-            <a:r>
-              <a:rPr lang="en-US" sz="1000" dirty="0" smtClean="0"/>
+            <a:endParaRPr lang="en-US" sz="1400" dirty="0"/>
+          </a:p>
+          <a:p>
+            <a:r>
+              <a:rPr lang="en-US" sz="1400" dirty="0" smtClean="0"/>
               <a:t>id=4 </a:t>
             </a:r>
             <a:r>
-              <a:rPr lang="en-US" sz="1000" dirty="0"/>
+              <a:rPr lang="en-US" sz="1400" dirty="0"/>
               <a:t>mean: [</a:t>
             </a:r>
             <a:r>
-              <a:rPr lang="en-US" sz="1000" dirty="0" smtClean="0"/>
+              <a:rPr lang="en-US" sz="1400" dirty="0" smtClean="0"/>
               <a:t>21.063 </a:t>
             </a:r>
             <a:r>
-              <a:rPr lang="en-US" sz="1000" dirty="0"/>
+              <a:rPr lang="en-US" sz="1400" dirty="0"/>
               <a:t>, 67.1666, 83.666] count: 6 variance </a:t>
             </a:r>
             <a:r>
-              <a:rPr lang="mr-IN" sz="1000" dirty="0"/>
+              <a:rPr lang="mr-IN" sz="1400" dirty="0"/>
               <a:t>…</a:t>
             </a:r>
-            <a:endParaRPr lang="en-US" sz="1000" dirty="0"/>
-          </a:p>
-          <a:p>
-            <a:r>
-              <a:rPr lang="en-US" sz="1000" dirty="0" smtClean="0"/>
+            <a:endParaRPr lang="en-US" sz="1400" dirty="0"/>
+          </a:p>
+          <a:p>
+            <a:r>
+              <a:rPr lang="en-US" sz="1400" dirty="0" smtClean="0"/>
               <a:t>id=5 </a:t>
             </a:r>
             <a:r>
-              <a:rPr lang="en-US" sz="1000" dirty="0"/>
+              <a:rPr lang="en-US" sz="1400" dirty="0"/>
               <a:t>mean: </a:t>
             </a:r>
             <a:r>
-              <a:rPr lang="en-US" sz="1000" dirty="0" smtClean="0"/>
+              <a:rPr lang="en-US" sz="1400" dirty="0" smtClean="0"/>
               <a:t>[3108.063 </a:t>
             </a:r>
             <a:r>
-              <a:rPr lang="en-US" sz="1000" dirty="0"/>
+              <a:rPr lang="en-US" sz="1400" dirty="0"/>
               <a:t>, 67.1666, 83.666] count: 6 variance </a:t>
             </a:r>
             <a:r>
-              <a:rPr lang="mr-IN" sz="1000" dirty="0"/>
+              <a:rPr lang="mr-IN" sz="1400" dirty="0"/>
               <a:t>…</a:t>
             </a:r>
-            <a:endParaRPr lang="en-US" sz="1000" dirty="0"/>
-          </a:p>
-          <a:p>
-            <a:r>
-              <a:rPr lang="en-US" sz="1000" dirty="0" smtClean="0"/>
+            <a:endParaRPr lang="en-US" sz="1400" dirty="0"/>
+          </a:p>
+          <a:p>
+            <a:r>
+              <a:rPr lang="en-US" sz="1400" dirty="0" smtClean="0"/>
               <a:t>id=6 </a:t>
             </a:r>
             <a:r>
-              <a:rPr lang="en-US" sz="1000" dirty="0"/>
+              <a:rPr lang="en-US" sz="1400" dirty="0"/>
               <a:t>mean: </a:t>
             </a:r>
             <a:r>
-              <a:rPr lang="en-US" sz="1000" dirty="0" smtClean="0"/>
+              <a:rPr lang="en-US" sz="1400" dirty="0" smtClean="0"/>
               <a:t>[1108.063 </a:t>
             </a:r>
             <a:r>
-              <a:rPr lang="en-US" sz="1000" dirty="0"/>
+              <a:rPr lang="en-US" sz="1400" dirty="0"/>
               <a:t>, 67.1666, 83.666] count: 6 variance </a:t>
             </a:r>
             <a:r>
-              <a:rPr lang="mr-IN" sz="1000" dirty="0" smtClean="0"/>
+              <a:rPr lang="mr-IN" sz="1400" dirty="0" smtClean="0"/>
               <a:t>…</a:t>
             </a:r>
-            <a:endParaRPr lang="en-US" sz="1000" dirty="0" smtClean="0"/>
-          </a:p>
-          <a:p>
-            <a:r>
-              <a:rPr lang="mr-IN" sz="1000" dirty="0" smtClean="0"/>
+            <a:endParaRPr lang="en-US" sz="1400" dirty="0" smtClean="0"/>
+          </a:p>
+          <a:p>
+            <a:r>
+              <a:rPr lang="mr-IN" sz="1400" dirty="0" smtClean="0"/>
               <a:t>…</a:t>
             </a:r>
-            <a:endParaRPr lang="en-US" sz="1000" dirty="0" smtClean="0"/>
-          </a:p>
-          <a:p>
-            <a:r>
-              <a:rPr lang="mr-IN" sz="1000" dirty="0" smtClean="0"/>
+            <a:endParaRPr lang="en-US" sz="1400" dirty="0" smtClean="0"/>
+          </a:p>
+          <a:p>
+            <a:r>
+              <a:rPr lang="mr-IN" sz="1400" dirty="0" smtClean="0"/>
               <a:t>…</a:t>
             </a:r>
             <a:r>
-              <a:rPr lang="en-US" sz="1000" dirty="0" smtClean="0"/>
+              <a:rPr lang="en-US" sz="1400" dirty="0" smtClean="0"/>
               <a:t>.</a:t>
             </a:r>
-            <a:endParaRPr lang="en-US" sz="1000" dirty="0"/>
+            <a:endParaRPr lang="en-US" sz="1400" dirty="0"/>
           </a:p>
           <a:p>
             <a:endParaRPr lang="en-US" sz="1000" dirty="0" smtClean="0"/>
@@ -8234,8 +8755,8 @@
         </p:nvSpPr>
         <p:spPr>
           <a:xfrm rot="10800000">
-            <a:off x="4624714" y="5246925"/>
-            <a:ext cx="1593206" cy="160387"/>
+            <a:off x="4624714" y="5246924"/>
+            <a:ext cx="625017" cy="160387"/>
           </a:xfrm>
           <a:prstGeom prst="rightArrow">
             <a:avLst/>
@@ -8274,7 +8795,7 @@
         </p:nvSpPr>
         <p:spPr>
           <a:xfrm>
-            <a:off x="7134281" y="4444009"/>
+            <a:off x="6521095" y="4465524"/>
             <a:ext cx="436760" cy="160388"/>
           </a:xfrm>
           <a:prstGeom prst="rightArrow">
@@ -8330,9 +8851,69 @@
         </p:blipFill>
         <p:spPr>
           <a:xfrm>
-            <a:off x="8686226" y="3535429"/>
+            <a:off x="9589868" y="5518481"/>
             <a:ext cx="1140297" cy="407249"/>
           </a:xfrm>
+        </p:spPr>
+      </p:pic>
+      <p:sp>
+        <p:nvSpPr>
+          <p:cNvPr id="3" name="TextBox 2"/>
+          <p:cNvSpPr txBox="1"/>
+          <p:nvPr/>
+        </p:nvSpPr>
+        <p:spPr>
+          <a:xfrm>
+            <a:off x="6096000" y="2386781"/>
+            <a:ext cx="2162287" cy="369332"/>
+          </a:xfrm>
+          <a:prstGeom prst="rect">
+            <a:avLst/>
+          </a:prstGeom>
+          <a:noFill/>
+        </p:spPr>
+        <p:txBody>
+          <a:bodyPr wrap="square" rtlCol="0">
+            <a:spAutoFit/>
+          </a:bodyPr>
+          <a:lstStyle/>
+          <a:p>
+            <a:r>
+              <a:rPr lang="en-US" smtClean="0"/>
+              <a:t>Spark Consumer</a:t>
+            </a:r>
+            <a:endParaRPr lang="en-US"/>
+          </a:p>
+        </p:txBody>
+      </p:sp>
+      <p:pic>
+        <p:nvPicPr>
+          <p:cNvPr id="10" name="Picture 9"/>
+          <p:cNvPicPr>
+            <a:picLocks noChangeAspect="1"/>
+          </p:cNvPicPr>
+          <p:nvPr/>
+        </p:nvPicPr>
+        <p:blipFill>
+          <a:blip r:embed="rId4">
+            <a:extLst>
+              <a:ext uri="{28A0092B-C50C-407E-A947-70E740481C1C}">
+                <a14:useLocalDpi xmlns:a14="http://schemas.microsoft.com/office/drawing/2010/main" val="0"/>
+              </a:ext>
+            </a:extLst>
+          </a:blip>
+          <a:stretch>
+            <a:fillRect/>
+          </a:stretch>
+        </p:blipFill>
+        <p:spPr>
+          <a:xfrm>
+            <a:off x="8069837" y="3251934"/>
+            <a:ext cx="939178" cy="602701"/>
+          </a:xfrm>
+          <a:prstGeom prst="rect">
+            <a:avLst/>
+          </a:prstGeom>
         </p:spPr>
       </p:pic>
     </p:spTree>
@@ -8345,6 +8926,13 @@
   <p:clrMapOvr>
     <a:masterClrMapping/>
   </p:clrMapOvr>
+  <p:timing>
+    <p:tnLst>
+      <p:par>
+        <p:cTn id="1" dur="indefinite" restart="never" nodeType="tmRoot"/>
+      </p:par>
+    </p:tnLst>
+  </p:timing>
 </p:sld>
 </file>
 
@@ -8402,28 +8990,69 @@
             <p:ph idx="1"/>
           </p:nvPr>
         </p:nvSpPr>
-        <p:spPr/>
-        <p:txBody>
-          <a:bodyPr/>
-          <a:lstStyle/>
-          <a:p>
+        <p:spPr>
+          <a:xfrm>
+            <a:off x="2231136" y="2638044"/>
+            <a:ext cx="7729728" cy="3429269"/>
+          </a:xfrm>
+        </p:spPr>
+        <p:txBody>
+          <a:bodyPr>
+            <a:normAutofit lnSpcReduction="10000"/>
+          </a:bodyPr>
+          <a:lstStyle/>
+          <a:p>
+            <a:pPr>
+              <a:buBlip>
+                <a:blip r:embed="rId2"/>
+              </a:buBlip>
+            </a:pPr>
             <a:r>
               <a:rPr lang="en-US" dirty="0" smtClean="0"/>
               <a:t>Flexibility</a:t>
             </a:r>
           </a:p>
           <a:p>
+            <a:pPr>
+              <a:buBlip>
+                <a:blip r:embed="rId2"/>
+              </a:buBlip>
+            </a:pPr>
+            <a:r>
+              <a:rPr lang="en-US" dirty="0"/>
+              <a:t>Creation of </a:t>
+            </a:r>
+            <a:r>
+              <a:rPr lang="en-US" dirty="0" err="1"/>
+              <a:t>subflows</a:t>
+            </a:r>
+            <a:r>
+              <a:rPr lang="en-US" dirty="0"/>
+              <a:t> using </a:t>
+            </a:r>
+            <a:r>
+              <a:rPr lang="en-US" dirty="0" err="1"/>
+              <a:t>Akka</a:t>
+            </a:r>
+            <a:r>
+              <a:rPr lang="en-US" dirty="0"/>
+              <a:t> Streams </a:t>
+            </a:r>
+            <a:r>
+              <a:rPr lang="en-US" dirty="0" err="1" smtClean="0"/>
+              <a:t>GraphDSL</a:t>
+            </a:r>
+            <a:endParaRPr lang="en-US" dirty="0" smtClean="0"/>
+          </a:p>
+          <a:p>
+            <a:pPr>
+              <a:buBlip>
+                <a:blip r:embed="rId2"/>
+              </a:buBlip>
+            </a:pPr>
             <a:r>
               <a:rPr lang="en-US" dirty="0" smtClean="0"/>
-              <a:t>Creation of </a:t>
-            </a:r>
-            <a:r>
-              <a:rPr lang="en-US" dirty="0" err="1" smtClean="0"/>
-              <a:t>subflows</a:t>
-            </a:r>
-            <a:r>
-              <a:rPr lang="en-US" dirty="0" smtClean="0"/>
-              <a:t> using </a:t>
+              <a:t>Integrates well with </a:t>
             </a:r>
             <a:r>
               <a:rPr lang="en-US" dirty="0" err="1" smtClean="0"/>
@@ -8431,48 +9060,80 @@
             </a:r>
             <a:r>
               <a:rPr lang="en-US" dirty="0" smtClean="0"/>
-              <a:t> Streams </a:t>
-            </a:r>
-            <a:r>
-              <a:rPr lang="en-US" dirty="0" err="1" smtClean="0"/>
-              <a:t>GraphDSL</a:t>
+              <a:t> Actors.</a:t>
+            </a:r>
+            <a:endParaRPr lang="en-US" dirty="0"/>
+          </a:p>
+          <a:p>
+            <a:pPr>
+              <a:buBlip>
+                <a:blip r:embed="rId2"/>
+              </a:buBlip>
+            </a:pPr>
+            <a:r>
+              <a:rPr lang="en-US" dirty="0"/>
+              <a:t>Fast learning curve</a:t>
+            </a:r>
+          </a:p>
+          <a:p>
+            <a:pPr>
+              <a:buBlip>
+                <a:blip r:embed="rId2"/>
+              </a:buBlip>
+            </a:pPr>
+            <a:r>
+              <a:rPr lang="en-US" dirty="0"/>
+              <a:t>Easy to test</a:t>
+            </a:r>
+          </a:p>
+          <a:p>
+            <a:pPr>
+              <a:buBlip>
+                <a:blip r:embed="rId2"/>
+              </a:buBlip>
+            </a:pPr>
+            <a:r>
+              <a:rPr lang="en-US" dirty="0"/>
+              <a:t>Back pressure streams by default</a:t>
+            </a:r>
+          </a:p>
+          <a:p>
+            <a:pPr>
+              <a:buBlip>
+                <a:blip r:embed="rId2"/>
+              </a:buBlip>
+            </a:pPr>
+            <a:r>
+              <a:rPr lang="en-US" dirty="0"/>
+              <a:t>Scala 2.12</a:t>
+            </a:r>
+          </a:p>
+          <a:p>
+            <a:pPr>
+              <a:buBlip>
+                <a:blip r:embed="rId3"/>
+              </a:buBlip>
+            </a:pPr>
+            <a:r>
+              <a:rPr lang="en-US" dirty="0" smtClean="0"/>
+              <a:t>Does not work in a cluster environment. Just one node</a:t>
+            </a:r>
+            <a:r>
+              <a:rPr lang="en-US" dirty="0" smtClean="0"/>
+              <a:t>.</a:t>
+            </a:r>
+          </a:p>
+          <a:p>
+            <a:pPr>
+              <a:buBlip>
+                <a:blip r:embed="rId3"/>
+              </a:buBlip>
+            </a:pPr>
+            <a:r>
+              <a:rPr lang="en-US" dirty="0" smtClean="0"/>
+              <a:t>Not supported windowing and watermarking.</a:t>
             </a:r>
             <a:endParaRPr lang="en-US" dirty="0" smtClean="0"/>
-          </a:p>
-          <a:p>
-            <a:r>
-              <a:rPr lang="en-US" dirty="0" smtClean="0"/>
-              <a:t>Fast learning curve</a:t>
-            </a:r>
-          </a:p>
-          <a:p>
-            <a:r>
-              <a:rPr lang="en-US" dirty="0" smtClean="0"/>
-              <a:t>Easy to test</a:t>
-            </a:r>
-          </a:p>
-          <a:p>
-            <a:r>
-              <a:rPr lang="en-US" dirty="0" smtClean="0"/>
-              <a:t>Back pressure </a:t>
-            </a:r>
-            <a:r>
-              <a:rPr lang="en-US" dirty="0" smtClean="0"/>
-              <a:t>streams by default</a:t>
-            </a:r>
-            <a:endParaRPr lang="en-US" dirty="0" smtClean="0"/>
-          </a:p>
-          <a:p>
-            <a:r>
-              <a:rPr lang="en-US" dirty="0" smtClean="0"/>
-              <a:t>Scala 2.12</a:t>
-            </a:r>
-          </a:p>
-          <a:p>
-            <a:r>
-              <a:rPr lang="en-US" dirty="0" smtClean="0"/>
-              <a:t>Does not work in a cluster environment. Just one node.</a:t>
-            </a:r>
           </a:p>
         </p:txBody>
       </p:sp>
@@ -8486,6 +9147,13 @@
   <p:clrMapOvr>
     <a:masterClrMapping/>
   </p:clrMapOvr>
+  <p:timing>
+    <p:tnLst>
+      <p:par>
+        <p:cTn id="1" dur="indefinite" restart="never" nodeType="tmRoot"/>
+      </p:par>
+    </p:tnLst>
+  </p:timing>
 </p:sld>
 </file>
 

</xml_diff>